<commit_message>
Cleaning up R and MATLAB code
</commit_message>
<xml_diff>
--- a/Laplace_Approximation/Documentation/laplace_diagnostic_slides.pptx
+++ b/Laplace_Approximation/Documentation/laplace_diagnostic_slides.pptx
@@ -6305,8 +6305,8 @@
           <a:chExt cx="0" cy="0"/>
         </a:xfrm>
       </p:grpSpPr>
-      <mc:AlternateContent xmlns:mc="http://schemas.openxmlformats.org/markup-compatibility/2006">
-        <mc:Choice xmlns:a14="http://schemas.microsoft.com/office/drawing/2010/main" Requires="a14">
+      <mc:AlternateContent xmlns:mc="http://schemas.openxmlformats.org/markup-compatibility/2006" xmlns:a14="http://schemas.microsoft.com/office/drawing/2010/main">
+        <mc:Choice Requires="a14">
           <p:sp>
             <p:nvSpPr>
               <p:cNvPr id="9" name="Content Placeholder 8">
@@ -6687,7 +6687,7 @@
             </p:txBody>
           </p:sp>
         </mc:Choice>
-        <mc:Fallback>
+        <mc:Fallback xmlns="">
           <p:sp>
             <p:nvSpPr>
               <p:cNvPr id="9" name="Content Placeholder 8">
@@ -6901,8 +6901,8 @@
           <a:chExt cx="0" cy="0"/>
         </a:xfrm>
       </p:grpSpPr>
-      <mc:AlternateContent xmlns:mc="http://schemas.openxmlformats.org/markup-compatibility/2006">
-        <mc:Choice xmlns:a14="http://schemas.microsoft.com/office/drawing/2010/main" Requires="a14">
+      <mc:AlternateContent xmlns:mc="http://schemas.openxmlformats.org/markup-compatibility/2006" xmlns:a14="http://schemas.microsoft.com/office/drawing/2010/main">
+        <mc:Choice Requires="a14">
           <p:sp>
             <p:nvSpPr>
               <p:cNvPr id="9" name="Content Placeholder 8">
@@ -7482,7 +7482,7 @@
             </p:txBody>
           </p:sp>
         </mc:Choice>
-        <mc:Fallback>
+        <mc:Fallback xmlns="">
           <p:sp>
             <p:nvSpPr>
               <p:cNvPr id="9" name="Content Placeholder 8">
@@ -7581,8 +7581,8 @@
           </a:p>
         </p:txBody>
       </p:sp>
-      <mc:AlternateContent xmlns:mc="http://schemas.openxmlformats.org/markup-compatibility/2006">
-        <mc:Choice xmlns:a14="http://schemas.microsoft.com/office/drawing/2010/main" Requires="a14">
+      <mc:AlternateContent xmlns:mc="http://schemas.openxmlformats.org/markup-compatibility/2006" xmlns:a14="http://schemas.microsoft.com/office/drawing/2010/main">
+        <mc:Choice Requires="a14">
           <p:sp>
             <p:nvSpPr>
               <p:cNvPr id="12" name="Title 1">
@@ -7649,7 +7649,7 @@
             </p:txBody>
           </p:sp>
         </mc:Choice>
-        <mc:Fallback>
+        <mc:Fallback xmlns="">
           <p:sp>
             <p:nvSpPr>
               <p:cNvPr id="12" name="Title 1">
@@ -8380,8 +8380,8 @@
           </a:p>
         </p:txBody>
       </p:sp>
-      <mc:AlternateContent xmlns:mc="http://schemas.openxmlformats.org/markup-compatibility/2006">
-        <mc:Choice xmlns:a14="http://schemas.microsoft.com/office/drawing/2010/main" Requires="a14">
+      <mc:AlternateContent xmlns:mc="http://schemas.openxmlformats.org/markup-compatibility/2006" xmlns:a14="http://schemas.microsoft.com/office/drawing/2010/main">
+        <mc:Choice Requires="a14">
           <p:sp>
             <p:nvSpPr>
               <p:cNvPr id="3" name="Text Placeholder 2">
@@ -8579,7 +8579,7 @@
             </p:txBody>
           </p:sp>
         </mc:Choice>
-        <mc:Fallback>
+        <mc:Fallback xmlns="">
           <p:sp>
             <p:nvSpPr>
               <p:cNvPr id="3" name="Text Placeholder 2">
@@ -8741,8 +8741,8 @@
           </a:p>
         </p:txBody>
       </p:sp>
-      <mc:AlternateContent xmlns:mc="http://schemas.openxmlformats.org/markup-compatibility/2006">
-        <mc:Choice xmlns:a14="http://schemas.microsoft.com/office/drawing/2010/main" Requires="a14">
+      <mc:AlternateContent xmlns:mc="http://schemas.openxmlformats.org/markup-compatibility/2006" xmlns:a14="http://schemas.microsoft.com/office/drawing/2010/main">
+        <mc:Choice Requires="a14">
           <p:sp>
             <p:nvSpPr>
               <p:cNvPr id="3" name="Text Placeholder 2">
@@ -9274,7 +9274,7 @@
             </p:txBody>
           </p:sp>
         </mc:Choice>
-        <mc:Fallback>
+        <mc:Fallback xmlns="">
           <p:sp>
             <p:nvSpPr>
               <p:cNvPr id="3" name="Text Placeholder 2">
@@ -11808,8 +11808,8 @@
           </a:p>
         </p:txBody>
       </p:sp>
-      <mc:AlternateContent xmlns:mc="http://schemas.openxmlformats.org/markup-compatibility/2006">
-        <mc:Choice xmlns:a14="http://schemas.microsoft.com/office/drawing/2010/main" Requires="a14">
+      <mc:AlternateContent xmlns:mc="http://schemas.openxmlformats.org/markup-compatibility/2006" xmlns:a14="http://schemas.microsoft.com/office/drawing/2010/main">
+        <mc:Choice Requires="a14">
           <p:sp>
             <p:nvSpPr>
               <p:cNvPr id="3" name="Text Placeholder 2">
@@ -12105,7 +12105,7 @@
             </p:txBody>
           </p:sp>
         </mc:Choice>
-        <mc:Fallback>
+        <mc:Fallback xmlns="">
           <p:sp>
             <p:nvSpPr>
               <p:cNvPr id="3" name="Text Placeholder 2">

</xml_diff>